<commit_message>
Uploading to the GitHub
Stable build
</commit_message>
<xml_diff>
--- a/Timelapse Video Working Hours.pptx
+++ b/Timelapse Video Working Hours.pptx
@@ -7,6 +7,7 @@
   <p:sldIdLst>
     <p:sldId id="256" r:id="rId2"/>
     <p:sldId id="258" r:id="rId3"/>
+    <p:sldId id="260" r:id="rId4"/>
   </p:sldIdLst>
   <p:sldSz cx="12192000" cy="6858000"/>
   <p:notesSz cx="6858000" cy="9144000"/>
@@ -105,6 +106,11 @@
       </a:defRPr>
     </a:lvl9pPr>
   </p:defaultTextStyle>
+  <p:extLst>
+    <p:ext uri="{EFAFB233-063F-42B5-8137-9DF3F51BA10A}">
+      <p15:sldGuideLst xmlns:p15="http://schemas.microsoft.com/office/powerpoint/2012/main"/>
+    </p:ext>
+  </p:extLst>
 </p:presentation>
 </file>
 
@@ -3111,7 +3117,7 @@
           <a:p>
             <a:fld id="{AB3BE53C-CC8A-4F42-8880-FB83B0C74B11}" type="datetimeFigureOut">
               <a:rPr lang="en-GB" smtClean="0"/>
-              <a:t>01/05/2016</a:t>
+              <a:t>03/05/2016</a:t>
             </a:fld>
             <a:endParaRPr lang="en-GB"/>
           </a:p>
@@ -3281,7 +3287,7 @@
           <a:p>
             <a:fld id="{AB3BE53C-CC8A-4F42-8880-FB83B0C74B11}" type="datetimeFigureOut">
               <a:rPr lang="en-GB" smtClean="0"/>
-              <a:t>01/05/2016</a:t>
+              <a:t>03/05/2016</a:t>
             </a:fld>
             <a:endParaRPr lang="en-GB"/>
           </a:p>
@@ -3461,7 +3467,7 @@
           <a:p>
             <a:fld id="{AB3BE53C-CC8A-4F42-8880-FB83B0C74B11}" type="datetimeFigureOut">
               <a:rPr lang="en-GB" smtClean="0"/>
-              <a:t>01/05/2016</a:t>
+              <a:t>03/05/2016</a:t>
             </a:fld>
             <a:endParaRPr lang="en-GB"/>
           </a:p>
@@ -3631,7 +3637,7 @@
           <a:p>
             <a:fld id="{AB3BE53C-CC8A-4F42-8880-FB83B0C74B11}" type="datetimeFigureOut">
               <a:rPr lang="en-GB" smtClean="0"/>
-              <a:t>01/05/2016</a:t>
+              <a:t>03/05/2016</a:t>
             </a:fld>
             <a:endParaRPr lang="en-GB"/>
           </a:p>
@@ -3877,7 +3883,7 @@
           <a:p>
             <a:fld id="{AB3BE53C-CC8A-4F42-8880-FB83B0C74B11}" type="datetimeFigureOut">
               <a:rPr lang="en-GB" smtClean="0"/>
-              <a:t>01/05/2016</a:t>
+              <a:t>03/05/2016</a:t>
             </a:fld>
             <a:endParaRPr lang="en-GB"/>
           </a:p>
@@ -4109,7 +4115,7 @@
           <a:p>
             <a:fld id="{AB3BE53C-CC8A-4F42-8880-FB83B0C74B11}" type="datetimeFigureOut">
               <a:rPr lang="en-GB" smtClean="0"/>
-              <a:t>01/05/2016</a:t>
+              <a:t>03/05/2016</a:t>
             </a:fld>
             <a:endParaRPr lang="en-GB"/>
           </a:p>
@@ -4476,7 +4482,7 @@
           <a:p>
             <a:fld id="{AB3BE53C-CC8A-4F42-8880-FB83B0C74B11}" type="datetimeFigureOut">
               <a:rPr lang="en-GB" smtClean="0"/>
-              <a:t>01/05/2016</a:t>
+              <a:t>03/05/2016</a:t>
             </a:fld>
             <a:endParaRPr lang="en-GB"/>
           </a:p>
@@ -4594,7 +4600,7 @@
           <a:p>
             <a:fld id="{AB3BE53C-CC8A-4F42-8880-FB83B0C74B11}" type="datetimeFigureOut">
               <a:rPr lang="en-GB" smtClean="0"/>
-              <a:t>01/05/2016</a:t>
+              <a:t>03/05/2016</a:t>
             </a:fld>
             <a:endParaRPr lang="en-GB"/>
           </a:p>
@@ -4689,7 +4695,7 @@
           <a:p>
             <a:fld id="{AB3BE53C-CC8A-4F42-8880-FB83B0C74B11}" type="datetimeFigureOut">
               <a:rPr lang="en-GB" smtClean="0"/>
-              <a:t>01/05/2016</a:t>
+              <a:t>03/05/2016</a:t>
             </a:fld>
             <a:endParaRPr lang="en-GB"/>
           </a:p>
@@ -4966,7 +4972,7 @@
           <a:p>
             <a:fld id="{AB3BE53C-CC8A-4F42-8880-FB83B0C74B11}" type="datetimeFigureOut">
               <a:rPr lang="en-GB" smtClean="0"/>
-              <a:t>01/05/2016</a:t>
+              <a:t>03/05/2016</a:t>
             </a:fld>
             <a:endParaRPr lang="en-GB"/>
           </a:p>
@@ -5219,7 +5225,7 @@
           <a:p>
             <a:fld id="{AB3BE53C-CC8A-4F42-8880-FB83B0C74B11}" type="datetimeFigureOut">
               <a:rPr lang="en-GB" smtClean="0"/>
-              <a:t>01/05/2016</a:t>
+              <a:t>03/05/2016</a:t>
             </a:fld>
             <a:endParaRPr lang="en-GB"/>
           </a:p>
@@ -5432,7 +5438,7 @@
           <a:p>
             <a:fld id="{AB3BE53C-CC8A-4F42-8880-FB83B0C74B11}" type="datetimeFigureOut">
               <a:rPr lang="en-GB" smtClean="0"/>
-              <a:t>01/05/2016</a:t>
+              <a:t>03/05/2016</a:t>
             </a:fld>
             <a:endParaRPr lang="en-GB"/>
           </a:p>
@@ -5905,8 +5911,8 @@
           <a:chExt cx="0" cy="0"/>
         </a:xfrm>
       </p:grpSpPr>
-      <mc:AlternateContent xmlns:mc="http://schemas.openxmlformats.org/markup-compatibility/2006">
-        <mc:Choice xmlns:p14="http://schemas.microsoft.com/office/powerpoint/2010/main" Requires="p14">
+      <mc:AlternateContent xmlns:mc="http://schemas.openxmlformats.org/markup-compatibility/2006" xmlns:p14="http://schemas.microsoft.com/office/powerpoint/2010/main">
+        <mc:Choice Requires="p14">
           <p:contentPart p14:bwMode="auto" r:id="rId2">
             <p14:nvContentPartPr>
               <p14:cNvPr id="21" name="Ink 20"/>
@@ -5919,7 +5925,7 @@
             </p14:xfrm>
           </p:contentPart>
         </mc:Choice>
-        <mc:Fallback>
+        <mc:Fallback xmlns="">
           <p:pic>
             <p:nvPicPr>
               <p:cNvPr id="21" name="Ink 20"/>
@@ -6628,6 +6634,606 @@
     <p:extLst>
       <p:ext uri="{BB962C8B-B14F-4D97-AF65-F5344CB8AC3E}">
         <p14:creationId xmlns:p14="http://schemas.microsoft.com/office/powerpoint/2010/main" val="1031794573"/>
+      </p:ext>
+    </p:extLst>
+  </p:cSld>
+  <p:clrMapOvr>
+    <a:masterClrMapping/>
+  </p:clrMapOvr>
+</p:sld>
+</file>
+
+<file path=ppt/slides/slide3.xml><?xml version="1.0" encoding="utf-8"?>
+<p:sld xmlns:a="http://schemas.openxmlformats.org/drawingml/2006/main" xmlns:r="http://schemas.openxmlformats.org/officeDocument/2006/relationships" xmlns:p="http://schemas.openxmlformats.org/presentationml/2006/main">
+  <p:cSld>
+    <p:spTree>
+      <p:nvGrpSpPr>
+        <p:cNvPr id="1" name=""/>
+        <p:cNvGrpSpPr/>
+        <p:nvPr/>
+      </p:nvGrpSpPr>
+      <p:grpSpPr>
+        <a:xfrm>
+          <a:off x="0" y="0"/>
+          <a:ext cx="0" cy="0"/>
+          <a:chOff x="0" y="0"/>
+          <a:chExt cx="0" cy="0"/>
+        </a:xfrm>
+      </p:grpSpPr>
+      <p:sp>
+        <p:nvSpPr>
+          <p:cNvPr id="38" name="Cloud 37"/>
+          <p:cNvSpPr/>
+          <p:nvPr/>
+        </p:nvSpPr>
+        <p:spPr>
+          <a:xfrm>
+            <a:off x="5528451" y="2240280"/>
+            <a:ext cx="5726430" cy="3874770"/>
+          </a:xfrm>
+          <a:prstGeom prst="cloud">
+            <a:avLst/>
+          </a:prstGeom>
+          <a:solidFill>
+            <a:schemeClr val="accent1">
+              <a:lumMod val="20000"/>
+              <a:lumOff val="80000"/>
+            </a:schemeClr>
+          </a:solidFill>
+        </p:spPr>
+        <p:style>
+          <a:lnRef idx="2">
+            <a:schemeClr val="accent1">
+              <a:shade val="50000"/>
+            </a:schemeClr>
+          </a:lnRef>
+          <a:fillRef idx="1">
+            <a:schemeClr val="accent1"/>
+          </a:fillRef>
+          <a:effectRef idx="0">
+            <a:schemeClr val="accent1"/>
+          </a:effectRef>
+          <a:fontRef idx="minor">
+            <a:schemeClr val="lt1"/>
+          </a:fontRef>
+        </p:style>
+        <p:txBody>
+          <a:bodyPr rtlCol="0" anchor="ctr"/>
+          <a:lstStyle/>
+          <a:p>
+            <a:pPr algn="ctr"/>
+            <a:endParaRPr lang="en-GB"/>
+          </a:p>
+        </p:txBody>
+      </p:sp>
+      <p:sp>
+        <p:nvSpPr>
+          <p:cNvPr id="2" name="Title 1"/>
+          <p:cNvSpPr>
+            <a:spLocks noGrp="1"/>
+          </p:cNvSpPr>
+          <p:nvPr>
+            <p:ph type="title"/>
+          </p:nvPr>
+        </p:nvSpPr>
+        <p:spPr/>
+        <p:txBody>
+          <a:bodyPr/>
+          <a:lstStyle/>
+          <a:p>
+            <a:r>
+              <a:rPr lang="en-GB" dirty="0"/>
+              <a:t>Data Movement</a:t>
+            </a:r>
+          </a:p>
+        </p:txBody>
+      </p:sp>
+      <p:sp>
+        <p:nvSpPr>
+          <p:cNvPr id="7" name="Flowchart: Magnetic Disk 6"/>
+          <p:cNvSpPr/>
+          <p:nvPr/>
+        </p:nvSpPr>
+        <p:spPr>
+          <a:xfrm>
+            <a:off x="8956491" y="3820080"/>
+            <a:ext cx="1021899" cy="889080"/>
+          </a:xfrm>
+          <a:prstGeom prst="flowChartMagneticDisk">
+            <a:avLst/>
+          </a:prstGeom>
+        </p:spPr>
+        <p:style>
+          <a:lnRef idx="2">
+            <a:schemeClr val="accent4">
+              <a:shade val="50000"/>
+            </a:schemeClr>
+          </a:lnRef>
+          <a:fillRef idx="1">
+            <a:schemeClr val="accent4"/>
+          </a:fillRef>
+          <a:effectRef idx="0">
+            <a:schemeClr val="accent4"/>
+          </a:effectRef>
+          <a:fontRef idx="minor">
+            <a:schemeClr val="lt1"/>
+          </a:fontRef>
+        </p:style>
+        <p:txBody>
+          <a:bodyPr rot="0" spcFirstLastPara="0" vert="horz" wrap="square" lIns="91440" tIns="45720" rIns="91440" bIns="45720" numCol="1" spcCol="0" rtlCol="0" fromWordArt="0" anchor="ctr" anchorCtr="0" forceAA="0" compatLnSpc="1">
+            <a:prstTxWarp prst="textNoShape">
+              <a:avLst/>
+            </a:prstTxWarp>
+            <a:noAutofit/>
+          </a:bodyPr>
+          <a:lstStyle/>
+          <a:p>
+            <a:r>
+              <a:rPr lang="en-GB" sz="2000" b="1" dirty="0">
+                <a:solidFill>
+                  <a:schemeClr val="tx1"/>
+                </a:solidFill>
+              </a:rPr>
+              <a:t>backup</a:t>
+            </a:r>
+            <a:endParaRPr lang="en-GB" b="1" dirty="0">
+              <a:solidFill>
+                <a:schemeClr val="tx1"/>
+              </a:solidFill>
+            </a:endParaRPr>
+          </a:p>
+        </p:txBody>
+      </p:sp>
+      <p:cxnSp>
+        <p:nvCxnSpPr>
+          <p:cNvPr id="9" name="Straight Arrow Connector 8"/>
+          <p:cNvCxnSpPr>
+            <a:endCxn id="6" idx="2"/>
+          </p:cNvCxnSpPr>
+          <p:nvPr/>
+        </p:nvCxnSpPr>
+        <p:spPr>
+          <a:xfrm flipV="1">
+            <a:off x="3205939" y="4276055"/>
+            <a:ext cx="3244037" cy="5708"/>
+          </a:xfrm>
+          <a:prstGeom prst="straightConnector1">
+            <a:avLst/>
+          </a:prstGeom>
+          <a:ln w="22225">
+            <a:tailEnd type="triangle"/>
+          </a:ln>
+        </p:spPr>
+        <p:style>
+          <a:lnRef idx="1">
+            <a:schemeClr val="dk1"/>
+          </a:lnRef>
+          <a:fillRef idx="0">
+            <a:schemeClr val="dk1"/>
+          </a:fillRef>
+          <a:effectRef idx="0">
+            <a:schemeClr val="dk1"/>
+          </a:effectRef>
+          <a:fontRef idx="minor">
+            <a:schemeClr val="tx1"/>
+          </a:fontRef>
+        </p:style>
+      </p:cxnSp>
+      <p:cxnSp>
+        <p:nvCxnSpPr>
+          <p:cNvPr id="14" name="Straight Arrow Connector 13"/>
+          <p:cNvCxnSpPr>
+            <a:endCxn id="34" idx="1"/>
+          </p:cNvCxnSpPr>
+          <p:nvPr/>
+        </p:nvCxnSpPr>
+        <p:spPr>
+          <a:xfrm flipV="1">
+            <a:off x="6994341" y="2965360"/>
+            <a:ext cx="1363081" cy="854720"/>
+          </a:xfrm>
+          <a:prstGeom prst="straightConnector1">
+            <a:avLst/>
+          </a:prstGeom>
+          <a:ln w="25400">
+            <a:solidFill>
+              <a:schemeClr val="tx1"/>
+            </a:solidFill>
+            <a:headEnd type="triangle"/>
+            <a:tailEnd type="triangle"/>
+          </a:ln>
+        </p:spPr>
+        <p:style>
+          <a:lnRef idx="1">
+            <a:schemeClr val="accent1"/>
+          </a:lnRef>
+          <a:fillRef idx="0">
+            <a:schemeClr val="accent1"/>
+          </a:fillRef>
+          <a:effectRef idx="0">
+            <a:schemeClr val="accent1"/>
+          </a:effectRef>
+          <a:fontRef idx="minor">
+            <a:schemeClr val="tx1"/>
+          </a:fontRef>
+        </p:style>
+      </p:cxnSp>
+      <p:sp>
+        <p:nvSpPr>
+          <p:cNvPr id="6" name="Flowchart: Magnetic Disk 5"/>
+          <p:cNvSpPr/>
+          <p:nvPr/>
+        </p:nvSpPr>
+        <p:spPr>
+          <a:xfrm>
+            <a:off x="6449976" y="3842950"/>
+            <a:ext cx="1088731" cy="866210"/>
+          </a:xfrm>
+          <a:prstGeom prst="flowChartMagneticDisk">
+            <a:avLst/>
+          </a:prstGeom>
+        </p:spPr>
+        <p:style>
+          <a:lnRef idx="2">
+            <a:schemeClr val="accent4">
+              <a:shade val="50000"/>
+            </a:schemeClr>
+          </a:lnRef>
+          <a:fillRef idx="1">
+            <a:schemeClr val="accent4"/>
+          </a:fillRef>
+          <a:effectRef idx="0">
+            <a:schemeClr val="accent4"/>
+          </a:effectRef>
+          <a:fontRef idx="minor">
+            <a:schemeClr val="lt1"/>
+          </a:fontRef>
+        </p:style>
+        <p:txBody>
+          <a:bodyPr rot="0" spcFirstLastPara="0" vert="horz" wrap="square" lIns="91440" tIns="45720" rIns="91440" bIns="45720" numCol="1" spcCol="0" rtlCol="0" fromWordArt="0" anchor="ctr" anchorCtr="0" forceAA="0" compatLnSpc="1">
+            <a:prstTxWarp prst="textNoShape">
+              <a:avLst/>
+            </a:prstTxWarp>
+            <a:noAutofit/>
+          </a:bodyPr>
+          <a:lstStyle/>
+          <a:p>
+            <a:r>
+              <a:rPr lang="en-GB" sz="2000" b="1" dirty="0">
+                <a:solidFill>
+                  <a:schemeClr val="tx1"/>
+                </a:solidFill>
+              </a:rPr>
+              <a:t>Share</a:t>
+            </a:r>
+            <a:endParaRPr lang="en-GB" b="1" dirty="0">
+              <a:solidFill>
+                <a:schemeClr val="tx1"/>
+              </a:solidFill>
+            </a:endParaRPr>
+          </a:p>
+        </p:txBody>
+      </p:sp>
+      <p:cxnSp>
+        <p:nvCxnSpPr>
+          <p:cNvPr id="23" name="Curved Connector 22"/>
+          <p:cNvCxnSpPr>
+            <a:stCxn id="6" idx="3"/>
+          </p:cNvCxnSpPr>
+          <p:nvPr/>
+        </p:nvCxnSpPr>
+        <p:spPr>
+          <a:xfrm rot="5400000" flipH="1" flipV="1">
+            <a:off x="7812608" y="3470028"/>
+            <a:ext cx="420865" cy="2057399"/>
+          </a:xfrm>
+          <a:prstGeom prst="curvedConnector4">
+            <a:avLst>
+              <a:gd name="adj1" fmla="val -54317"/>
+              <a:gd name="adj2" fmla="val 63229"/>
+            </a:avLst>
+          </a:prstGeom>
+          <a:ln w="25400">
+            <a:solidFill>
+              <a:schemeClr val="tx1"/>
+            </a:solidFill>
+            <a:tailEnd type="triangle"/>
+          </a:ln>
+        </p:spPr>
+        <p:style>
+          <a:lnRef idx="1">
+            <a:schemeClr val="accent1"/>
+          </a:lnRef>
+          <a:fillRef idx="0">
+            <a:schemeClr val="accent1"/>
+          </a:fillRef>
+          <a:effectRef idx="0">
+            <a:schemeClr val="accent1"/>
+          </a:effectRef>
+          <a:fontRef idx="minor">
+            <a:schemeClr val="tx1"/>
+          </a:fontRef>
+        </p:style>
+      </p:cxnSp>
+      <p:pic>
+        <p:nvPicPr>
+          <p:cNvPr id="34" name="Picture 33"/>
+          <p:cNvPicPr>
+            <a:picLocks noChangeAspect="1"/>
+          </p:cNvPicPr>
+          <p:nvPr/>
+        </p:nvPicPr>
+        <p:blipFill>
+          <a:blip r:embed="rId2"/>
+          <a:stretch>
+            <a:fillRect/>
+          </a:stretch>
+        </p:blipFill>
+        <p:spPr>
+          <a:xfrm>
+            <a:off x="8357422" y="2596480"/>
+            <a:ext cx="514485" cy="737760"/>
+          </a:xfrm>
+          <a:prstGeom prst="rect">
+            <a:avLst/>
+          </a:prstGeom>
+        </p:spPr>
+      </p:pic>
+      <p:pic>
+        <p:nvPicPr>
+          <p:cNvPr id="41" name="Picture 40"/>
+          <p:cNvPicPr/>
+          <p:nvPr/>
+        </p:nvPicPr>
+        <p:blipFill>
+          <a:blip r:embed="rId3" cstate="print">
+            <a:extLst>
+              <a:ext uri="{28A0092B-C50C-407E-A947-70E740481C1C}">
+                <a14:useLocalDpi xmlns:a14="http://schemas.microsoft.com/office/drawing/2010/main" val="0"/>
+              </a:ext>
+            </a:extLst>
+          </a:blip>
+          <a:stretch>
+            <a:fillRect/>
+          </a:stretch>
+        </p:blipFill>
+        <p:spPr>
+          <a:xfrm>
+            <a:off x="967715" y="3685182"/>
+            <a:ext cx="2322512" cy="1158875"/>
+          </a:xfrm>
+          <a:prstGeom prst="rect">
+            <a:avLst/>
+          </a:prstGeom>
+        </p:spPr>
+      </p:pic>
+      <p:sp>
+        <p:nvSpPr>
+          <p:cNvPr id="43" name="TextBox 42"/>
+          <p:cNvSpPr txBox="1"/>
+          <p:nvPr/>
+        </p:nvSpPr>
+        <p:spPr>
+          <a:xfrm>
+            <a:off x="967715" y="4937760"/>
+            <a:ext cx="2238224" cy="369332"/>
+          </a:xfrm>
+          <a:prstGeom prst="rect">
+            <a:avLst/>
+          </a:prstGeom>
+          <a:noFill/>
+        </p:spPr>
+        <p:txBody>
+          <a:bodyPr wrap="square" rtlCol="0">
+            <a:spAutoFit/>
+          </a:bodyPr>
+          <a:lstStyle/>
+          <a:p>
+            <a:r>
+              <a:rPr lang="en-GB"/>
+              <a:t>Raspberry Pi Device</a:t>
+            </a:r>
+            <a:endParaRPr lang="en-GB" dirty="0"/>
+          </a:p>
+        </p:txBody>
+      </p:sp>
+      <p:sp>
+        <p:nvSpPr>
+          <p:cNvPr id="44" name="TextBox 43"/>
+          <p:cNvSpPr txBox="1"/>
+          <p:nvPr/>
+        </p:nvSpPr>
+        <p:spPr>
+          <a:xfrm>
+            <a:off x="7669756" y="3263869"/>
+            <a:ext cx="1979719" cy="369332"/>
+          </a:xfrm>
+          <a:prstGeom prst="rect">
+            <a:avLst/>
+          </a:prstGeom>
+          <a:noFill/>
+        </p:spPr>
+        <p:txBody>
+          <a:bodyPr wrap="square" rtlCol="0">
+            <a:spAutoFit/>
+          </a:bodyPr>
+          <a:lstStyle/>
+          <a:p>
+            <a:r>
+              <a:rPr lang="en-GB" dirty="0">
+                <a:solidFill>
+                  <a:schemeClr val="accent5">
+                    <a:lumMod val="75000"/>
+                  </a:schemeClr>
+                </a:solidFill>
+              </a:rPr>
+              <a:t>Compute Instance</a:t>
+            </a:r>
+          </a:p>
+        </p:txBody>
+      </p:sp>
+      <p:sp>
+        <p:nvSpPr>
+          <p:cNvPr id="47" name="TextBox 46"/>
+          <p:cNvSpPr txBox="1"/>
+          <p:nvPr/>
+        </p:nvSpPr>
+        <p:spPr>
+          <a:xfrm>
+            <a:off x="7066825" y="5154505"/>
+            <a:ext cx="2649682" cy="461665"/>
+          </a:xfrm>
+          <a:prstGeom prst="rect">
+            <a:avLst/>
+          </a:prstGeom>
+          <a:noFill/>
+        </p:spPr>
+        <p:txBody>
+          <a:bodyPr wrap="square" rtlCol="0">
+            <a:spAutoFit/>
+          </a:bodyPr>
+          <a:lstStyle/>
+          <a:p>
+            <a:r>
+              <a:rPr lang="en-GB" sz="2400" dirty="0"/>
+              <a:t>Microsoft Azure </a:t>
+            </a:r>
+          </a:p>
+        </p:txBody>
+      </p:sp>
+      <p:sp>
+        <p:nvSpPr>
+          <p:cNvPr id="48" name="Flowchart: Connector 47"/>
+          <p:cNvSpPr/>
+          <p:nvPr/>
+        </p:nvSpPr>
+        <p:spPr>
+          <a:xfrm>
+            <a:off x="4069482" y="3914206"/>
+            <a:ext cx="370237" cy="361849"/>
+          </a:xfrm>
+          <a:prstGeom prst="flowChartConnector">
+            <a:avLst/>
+          </a:prstGeom>
+        </p:spPr>
+        <p:style>
+          <a:lnRef idx="2">
+            <a:schemeClr val="accent2">
+              <a:shade val="50000"/>
+            </a:schemeClr>
+          </a:lnRef>
+          <a:fillRef idx="1">
+            <a:schemeClr val="accent2"/>
+          </a:fillRef>
+          <a:effectRef idx="0">
+            <a:schemeClr val="accent2"/>
+          </a:effectRef>
+          <a:fontRef idx="minor">
+            <a:schemeClr val="lt1"/>
+          </a:fontRef>
+        </p:style>
+        <p:txBody>
+          <a:bodyPr rtlCol="0" anchor="ctr"/>
+          <a:lstStyle/>
+          <a:p>
+            <a:pPr algn="ctr"/>
+            <a:r>
+              <a:rPr lang="en-GB" dirty="0"/>
+              <a:t>1</a:t>
+            </a:r>
+          </a:p>
+        </p:txBody>
+      </p:sp>
+      <p:sp>
+        <p:nvSpPr>
+          <p:cNvPr id="50" name="Flowchart: Connector 49"/>
+          <p:cNvSpPr/>
+          <p:nvPr/>
+        </p:nvSpPr>
+        <p:spPr>
+          <a:xfrm>
+            <a:off x="7442819" y="3183867"/>
+            <a:ext cx="370237" cy="361849"/>
+          </a:xfrm>
+          <a:prstGeom prst="flowChartConnector">
+            <a:avLst/>
+          </a:prstGeom>
+        </p:spPr>
+        <p:style>
+          <a:lnRef idx="2">
+            <a:schemeClr val="accent2">
+              <a:shade val="50000"/>
+            </a:schemeClr>
+          </a:lnRef>
+          <a:fillRef idx="1">
+            <a:schemeClr val="accent2"/>
+          </a:fillRef>
+          <a:effectRef idx="0">
+            <a:schemeClr val="accent2"/>
+          </a:effectRef>
+          <a:fontRef idx="minor">
+            <a:schemeClr val="lt1"/>
+          </a:fontRef>
+        </p:style>
+        <p:txBody>
+          <a:bodyPr rtlCol="0" anchor="ctr"/>
+          <a:lstStyle/>
+          <a:p>
+            <a:pPr algn="ctr"/>
+            <a:r>
+              <a:rPr lang="en-GB" dirty="0"/>
+              <a:t>2</a:t>
+            </a:r>
+          </a:p>
+        </p:txBody>
+      </p:sp>
+      <p:sp>
+        <p:nvSpPr>
+          <p:cNvPr id="51" name="Flowchart: Connector 50"/>
+          <p:cNvSpPr/>
+          <p:nvPr/>
+        </p:nvSpPr>
+        <p:spPr>
+          <a:xfrm>
+            <a:off x="8083072" y="4415826"/>
+            <a:ext cx="370237" cy="361849"/>
+          </a:xfrm>
+          <a:prstGeom prst="flowChartConnector">
+            <a:avLst/>
+          </a:prstGeom>
+        </p:spPr>
+        <p:style>
+          <a:lnRef idx="2">
+            <a:schemeClr val="accent2">
+              <a:shade val="50000"/>
+            </a:schemeClr>
+          </a:lnRef>
+          <a:fillRef idx="1">
+            <a:schemeClr val="accent2"/>
+          </a:fillRef>
+          <a:effectRef idx="0">
+            <a:schemeClr val="accent2"/>
+          </a:effectRef>
+          <a:fontRef idx="minor">
+            <a:schemeClr val="lt1"/>
+          </a:fontRef>
+        </p:style>
+        <p:txBody>
+          <a:bodyPr rtlCol="0" anchor="ctr"/>
+          <a:lstStyle/>
+          <a:p>
+            <a:pPr algn="ctr"/>
+            <a:r>
+              <a:rPr lang="en-GB" dirty="0"/>
+              <a:t>3</a:t>
+            </a:r>
+          </a:p>
+        </p:txBody>
+      </p:sp>
+    </p:spTree>
+    <p:extLst>
+      <p:ext uri="{BB962C8B-B14F-4D97-AF65-F5344CB8AC3E}">
+        <p14:creationId xmlns:p14="http://schemas.microsoft.com/office/powerpoint/2010/main" val="1458115075"/>
       </p:ext>
     </p:extLst>
   </p:cSld>

</xml_diff>